<commit_message>
edit: final materi of workshop (readonly)
</commit_message>
<xml_diff>
--- a/workshop/materi/1 - Pengenalan, Prasyarat, Kenapa Laravel, Design Pattern dan MVC.pptx
+++ b/workshop/materi/1 - Pengenalan, Prasyarat, Kenapa Laravel, Design Pattern dan MVC.pptx
@@ -121,6 +121,7 @@
       </a:defRPr>
     </a:lvl9pPr>
   </p:defaultTextStyle>
+  <p:modifyVerifier cryptProviderType="rsaAES" cryptAlgorithmClass="hash" cryptAlgorithmType="typeAny" cryptAlgorithmSid="14" spinCount="100000" saltData="tY7ouD9h3CzMLnoR97tOfA==" hashData="U41ybH6n8RwWcFzl9rbLrsgJUYXwyCRcc4KRRXxDoqxtbVRhuATBwJYh1WLNzi9AUwB7SdkmUUYmhAED6nFLdw=="/>
   <p:extLst>
     <p:ext uri="{EFAFB233-063F-42B5-8137-9DF3F51BA10A}">
       <p15:sldGuideLst xmlns:p15="http://schemas.microsoft.com/office/powerpoint/2012/main">
@@ -304,7 +305,7 @@
           <a:p>
             <a:fld id="{297FE354-37D6-4FB6-8D97-DBC5B474A4AA}" type="datetimeFigureOut">
               <a:rPr lang="en-ID" smtClean="0"/>
-              <a:t>23/12/22</a:t>
+              <a:t>25/12/2022</a:t>
             </a:fld>
             <a:endParaRPr lang="en-ID"/>
           </a:p>
@@ -504,7 +505,7 @@
           <a:p>
             <a:fld id="{297FE354-37D6-4FB6-8D97-DBC5B474A4AA}" type="datetimeFigureOut">
               <a:rPr lang="en-ID" smtClean="0"/>
-              <a:t>23/12/22</a:t>
+              <a:t>25/12/2022</a:t>
             </a:fld>
             <a:endParaRPr lang="en-ID"/>
           </a:p>
@@ -714,7 +715,7 @@
           <a:p>
             <a:fld id="{297FE354-37D6-4FB6-8D97-DBC5B474A4AA}" type="datetimeFigureOut">
               <a:rPr lang="en-ID" smtClean="0"/>
-              <a:t>23/12/22</a:t>
+              <a:t>25/12/2022</a:t>
             </a:fld>
             <a:endParaRPr lang="en-ID"/>
           </a:p>
@@ -914,7 +915,7 @@
           <a:p>
             <a:fld id="{297FE354-37D6-4FB6-8D97-DBC5B474A4AA}" type="datetimeFigureOut">
               <a:rPr lang="en-ID" smtClean="0"/>
-              <a:t>23/12/22</a:t>
+              <a:t>25/12/2022</a:t>
             </a:fld>
             <a:endParaRPr lang="en-ID"/>
           </a:p>
@@ -1190,7 +1191,7 @@
           <a:p>
             <a:fld id="{297FE354-37D6-4FB6-8D97-DBC5B474A4AA}" type="datetimeFigureOut">
               <a:rPr lang="en-ID" smtClean="0"/>
-              <a:t>23/12/22</a:t>
+              <a:t>25/12/2022</a:t>
             </a:fld>
             <a:endParaRPr lang="en-ID"/>
           </a:p>
@@ -1458,7 +1459,7 @@
           <a:p>
             <a:fld id="{297FE354-37D6-4FB6-8D97-DBC5B474A4AA}" type="datetimeFigureOut">
               <a:rPr lang="en-ID" smtClean="0"/>
-              <a:t>23/12/22</a:t>
+              <a:t>25/12/2022</a:t>
             </a:fld>
             <a:endParaRPr lang="en-ID"/>
           </a:p>
@@ -1873,7 +1874,7 @@
           <a:p>
             <a:fld id="{297FE354-37D6-4FB6-8D97-DBC5B474A4AA}" type="datetimeFigureOut">
               <a:rPr lang="en-ID" smtClean="0"/>
-              <a:t>23/12/22</a:t>
+              <a:t>25/12/2022</a:t>
             </a:fld>
             <a:endParaRPr lang="en-ID"/>
           </a:p>
@@ -2015,7 +2016,7 @@
           <a:p>
             <a:fld id="{297FE354-37D6-4FB6-8D97-DBC5B474A4AA}" type="datetimeFigureOut">
               <a:rPr lang="en-ID" smtClean="0"/>
-              <a:t>23/12/22</a:t>
+              <a:t>25/12/2022</a:t>
             </a:fld>
             <a:endParaRPr lang="en-ID"/>
           </a:p>
@@ -2128,7 +2129,7 @@
           <a:p>
             <a:fld id="{297FE354-37D6-4FB6-8D97-DBC5B474A4AA}" type="datetimeFigureOut">
               <a:rPr lang="en-ID" smtClean="0"/>
-              <a:t>23/12/22</a:t>
+              <a:t>25/12/2022</a:t>
             </a:fld>
             <a:endParaRPr lang="en-ID"/>
           </a:p>
@@ -2441,7 +2442,7 @@
           <a:p>
             <a:fld id="{297FE354-37D6-4FB6-8D97-DBC5B474A4AA}" type="datetimeFigureOut">
               <a:rPr lang="en-ID" smtClean="0"/>
-              <a:t>23/12/22</a:t>
+              <a:t>25/12/2022</a:t>
             </a:fld>
             <a:endParaRPr lang="en-ID"/>
           </a:p>
@@ -2730,7 +2731,7 @@
           <a:p>
             <a:fld id="{297FE354-37D6-4FB6-8D97-DBC5B474A4AA}" type="datetimeFigureOut">
               <a:rPr lang="en-ID" smtClean="0"/>
-              <a:t>23/12/22</a:t>
+              <a:t>25/12/2022</a:t>
             </a:fld>
             <a:endParaRPr lang="en-ID"/>
           </a:p>
@@ -2973,7 +2974,7 @@
           <a:p>
             <a:fld id="{297FE354-37D6-4FB6-8D97-DBC5B474A4AA}" type="datetimeFigureOut">
               <a:rPr lang="en-ID" smtClean="0"/>
-              <a:t>23/12/22</a:t>
+              <a:t>25/12/2022</a:t>
             </a:fld>
             <a:endParaRPr lang="en-ID"/>
           </a:p>

</xml_diff>